<commit_message>
lots of work backup
</commit_message>
<xml_diff>
--- a/Force Sensor Design.pptx
+++ b/Force Sensor Design.pptx
@@ -9,6 +9,7 @@
     <p:sldId id="258" r:id="rId3"/>
     <p:sldId id="259" r:id="rId4"/>
     <p:sldId id="257" r:id="rId5"/>
+    <p:sldId id="260" r:id="rId6"/>
   </p:sldIdLst>
   <p:sldSz cx="12192000" cy="6858000"/>
   <p:notesSz cx="6858000" cy="9144000"/>
@@ -264,7 +265,7 @@
           <a:p>
             <a:fld id="{E4F623CE-2FAB-4E7B-A3DC-409CC97FA269}" type="datetimeFigureOut">
               <a:rPr lang="en-GB" smtClean="0"/>
-              <a:t>23/01/2019</a:t>
+              <a:t>18/02/2019</a:t>
             </a:fld>
             <a:endParaRPr lang="en-GB"/>
           </a:p>
@@ -464,7 +465,7 @@
           <a:p>
             <a:fld id="{E4F623CE-2FAB-4E7B-A3DC-409CC97FA269}" type="datetimeFigureOut">
               <a:rPr lang="en-GB" smtClean="0"/>
-              <a:t>23/01/2019</a:t>
+              <a:t>18/02/2019</a:t>
             </a:fld>
             <a:endParaRPr lang="en-GB"/>
           </a:p>
@@ -674,7 +675,7 @@
           <a:p>
             <a:fld id="{E4F623CE-2FAB-4E7B-A3DC-409CC97FA269}" type="datetimeFigureOut">
               <a:rPr lang="en-GB" smtClean="0"/>
-              <a:t>23/01/2019</a:t>
+              <a:t>18/02/2019</a:t>
             </a:fld>
             <a:endParaRPr lang="en-GB"/>
           </a:p>
@@ -874,7 +875,7 @@
           <a:p>
             <a:fld id="{E4F623CE-2FAB-4E7B-A3DC-409CC97FA269}" type="datetimeFigureOut">
               <a:rPr lang="en-GB" smtClean="0"/>
-              <a:t>23/01/2019</a:t>
+              <a:t>18/02/2019</a:t>
             </a:fld>
             <a:endParaRPr lang="en-GB"/>
           </a:p>
@@ -1150,7 +1151,7 @@
           <a:p>
             <a:fld id="{E4F623CE-2FAB-4E7B-A3DC-409CC97FA269}" type="datetimeFigureOut">
               <a:rPr lang="en-GB" smtClean="0"/>
-              <a:t>23/01/2019</a:t>
+              <a:t>18/02/2019</a:t>
             </a:fld>
             <a:endParaRPr lang="en-GB"/>
           </a:p>
@@ -1418,7 +1419,7 @@
           <a:p>
             <a:fld id="{E4F623CE-2FAB-4E7B-A3DC-409CC97FA269}" type="datetimeFigureOut">
               <a:rPr lang="en-GB" smtClean="0"/>
-              <a:t>23/01/2019</a:t>
+              <a:t>18/02/2019</a:t>
             </a:fld>
             <a:endParaRPr lang="en-GB"/>
           </a:p>
@@ -1833,7 +1834,7 @@
           <a:p>
             <a:fld id="{E4F623CE-2FAB-4E7B-A3DC-409CC97FA269}" type="datetimeFigureOut">
               <a:rPr lang="en-GB" smtClean="0"/>
-              <a:t>23/01/2019</a:t>
+              <a:t>18/02/2019</a:t>
             </a:fld>
             <a:endParaRPr lang="en-GB"/>
           </a:p>
@@ -1975,7 +1976,7 @@
           <a:p>
             <a:fld id="{E4F623CE-2FAB-4E7B-A3DC-409CC97FA269}" type="datetimeFigureOut">
               <a:rPr lang="en-GB" smtClean="0"/>
-              <a:t>23/01/2019</a:t>
+              <a:t>18/02/2019</a:t>
             </a:fld>
             <a:endParaRPr lang="en-GB"/>
           </a:p>
@@ -2088,7 +2089,7 @@
           <a:p>
             <a:fld id="{E4F623CE-2FAB-4E7B-A3DC-409CC97FA269}" type="datetimeFigureOut">
               <a:rPr lang="en-GB" smtClean="0"/>
-              <a:t>23/01/2019</a:t>
+              <a:t>18/02/2019</a:t>
             </a:fld>
             <a:endParaRPr lang="en-GB"/>
           </a:p>
@@ -2401,7 +2402,7 @@
           <a:p>
             <a:fld id="{E4F623CE-2FAB-4E7B-A3DC-409CC97FA269}" type="datetimeFigureOut">
               <a:rPr lang="en-GB" smtClean="0"/>
-              <a:t>23/01/2019</a:t>
+              <a:t>18/02/2019</a:t>
             </a:fld>
             <a:endParaRPr lang="en-GB"/>
           </a:p>
@@ -2690,7 +2691,7 @@
           <a:p>
             <a:fld id="{E4F623CE-2FAB-4E7B-A3DC-409CC97FA269}" type="datetimeFigureOut">
               <a:rPr lang="en-GB" smtClean="0"/>
-              <a:t>23/01/2019</a:t>
+              <a:t>18/02/2019</a:t>
             </a:fld>
             <a:endParaRPr lang="en-GB"/>
           </a:p>
@@ -2933,7 +2934,7 @@
           <a:p>
             <a:fld id="{E4F623CE-2FAB-4E7B-A3DC-409CC97FA269}" type="datetimeFigureOut">
               <a:rPr lang="en-GB" smtClean="0"/>
-              <a:t>23/01/2019</a:t>
+              <a:t>18/02/2019</a:t>
             </a:fld>
             <a:endParaRPr lang="en-GB"/>
           </a:p>
@@ -6901,6 +6902,75 @@
 </p:sld>
 </file>
 
+<file path=ppt/slides/slide5.xml><?xml version="1.0" encoding="utf-8"?>
+<p:sld xmlns:a="http://schemas.openxmlformats.org/drawingml/2006/main" xmlns:r="http://schemas.openxmlformats.org/officeDocument/2006/relationships" xmlns:p="http://schemas.openxmlformats.org/presentationml/2006/main">
+  <p:cSld>
+    <p:spTree>
+      <p:nvGrpSpPr>
+        <p:cNvPr id="1" name=""/>
+        <p:cNvGrpSpPr/>
+        <p:nvPr/>
+      </p:nvGrpSpPr>
+      <p:grpSpPr>
+        <a:xfrm>
+          <a:off x="0" y="0"/>
+          <a:ext cx="0" cy="0"/>
+          <a:chOff x="0" y="0"/>
+          <a:chExt cx="0" cy="0"/>
+        </a:xfrm>
+      </p:grpSpPr>
+      <p:sp>
+        <p:nvSpPr>
+          <p:cNvPr id="4" name="TextBox 3">
+            <a:extLst>
+              <a:ext uri="{FF2B5EF4-FFF2-40B4-BE49-F238E27FC236}">
+                <a16:creationId xmlns:a16="http://schemas.microsoft.com/office/drawing/2014/main" id="{835575F8-733D-4FDA-821E-38DE87990067}"/>
+              </a:ext>
+            </a:extLst>
+          </p:cNvPr>
+          <p:cNvSpPr txBox="1"/>
+          <p:nvPr/>
+        </p:nvSpPr>
+        <p:spPr>
+          <a:xfrm>
+            <a:off x="5022574" y="1696278"/>
+            <a:ext cx="3968779" cy="369332"/>
+          </a:xfrm>
+          <a:prstGeom prst="rect">
+            <a:avLst/>
+          </a:prstGeom>
+          <a:noFill/>
+        </p:spPr>
+        <p:txBody>
+          <a:bodyPr wrap="none" rtlCol="0">
+            <a:spAutoFit/>
+          </a:bodyPr>
+          <a:lstStyle/>
+          <a:p>
+            <a:r>
+              <a:rPr lang="en-GB" dirty="0"/>
+              <a:t>Email Dom the specs for </a:t>
+            </a:r>
+            <a:r>
+              <a:rPr lang="en-GB"/>
+              <a:t>simulation stuff</a:t>
+            </a:r>
+          </a:p>
+        </p:txBody>
+      </p:sp>
+    </p:spTree>
+    <p:extLst>
+      <p:ext uri="{BB962C8B-B14F-4D97-AF65-F5344CB8AC3E}">
+        <p14:creationId xmlns:p14="http://schemas.microsoft.com/office/powerpoint/2010/main" val="1733689356"/>
+      </p:ext>
+    </p:extLst>
+  </p:cSld>
+  <p:clrMapOvr>
+    <a:masterClrMapping/>
+  </p:clrMapOvr>
+</p:sld>
+</file>
+
 <file path=ppt/theme/theme1.xml><?xml version="1.0" encoding="utf-8"?>
 <a:theme xmlns:a="http://schemas.openxmlformats.org/drawingml/2006/main" name="Office Theme">
   <a:themeElements>

</xml_diff>